<commit_message>
ok to pass - Commented GitLatch Commit @ 2024-6-25-7-4-57-716
</commit_message>
<xml_diff>
--- a/june25.pptx
+++ b/june25.pptx
@@ -107,6 +107,11 @@
       </a:defRPr>
     </a:lvl9pPr>
   </p:defaultTextStyle>
+  <p:extLst>
+    <p:ext uri="{EFAFB233-063F-42B5-8137-9DF3F51BA10A}">
+      <p15:sldGuideLst xmlns:p15="http://schemas.microsoft.com/office/powerpoint/2012/main"/>
+    </p:ext>
+  </p:extLst>
 </p:presentation>
 </file>
 
@@ -2568,7 +2573,10 @@
             </a:lvl9pPr>
           </a:lstStyle>
           <a:p>
-            <a:endParaRPr lang="en-US"/>
+            <a:r>
+              <a:rPr lang="en-US"/>
+              <a:t>Click icon to add picture</a:t>
+            </a:r>
           </a:p>
         </p:txBody>
       </p:sp>
@@ -3345,6 +3353,10 @@
           <a:bodyPr/>
           <a:lstStyle/>
           <a:p>
+            <a:r>
+              <a:rPr lang="en-IN"/>
+              <a:t>est12</a:t>
+            </a:r>
             <a:endParaRPr lang="en-US"/>
           </a:p>
         </p:txBody>

</xml_diff>

<commit_message>
Commentless GitLatch Commit @ 2024-6-25-9-40-35-265
</commit_message>
<xml_diff>
--- a/june25.pptx
+++ b/june25.pptx
@@ -3355,9 +3355,9 @@
           <a:p>
             <a:r>
               <a:rPr lang="en-IN"/>
-              <a:t>est12</a:t>
-            </a:r>
-            <a:endParaRPr lang="en-US"/>
+              <a:t>estaa12</a:t>
+            </a:r>
+            <a:endParaRPr lang="en-US" dirty="0"/>
           </a:p>
         </p:txBody>
       </p:sp>
@@ -3726,7 +3726,7 @@
 
 <file path=ppt/webextensions/taskpanes.xml><?xml version="1.0" encoding="utf-8"?>
 <wetp:taskpanes xmlns:wetp="http://schemas.microsoft.com/office/webextensions/taskpanes/2010/11">
-  <wetp:taskpane dockstate="right" visibility="0" width="438" row="1">
+  <wetp:taskpane dockstate="right" visibility="0" width="525" row="0">
     <wetp:webextensionref xmlns:r="http://schemas.openxmlformats.org/officeDocument/2006/relationships" r:id="rId1"/>
   </wetp:taskpane>
 </wetp:taskpanes>

</xml_diff>

<commit_message>
t - Commented GitLatch Commit @ 2024-6-25-9-44-56-331
</commit_message>
<xml_diff>
--- a/june25.pptx
+++ b/june25.pptx
@@ -3355,9 +3355,9 @@
           <a:p>
             <a:r>
               <a:rPr lang="en-IN"/>
-              <a:t>estaa12</a:t>
-            </a:r>
-            <a:endParaRPr lang="en-US" dirty="0"/>
+              <a:t>est12</a:t>
+            </a:r>
+            <a:endParaRPr lang="en-US"/>
           </a:p>
         </p:txBody>
       </p:sp>

</xml_diff>

<commit_message>
Test - Commented GitLatch Commit @ 2024-6-25-9-46-28-184
</commit_message>
<xml_diff>
--- a/june25.pptx
+++ b/june25.pptx
@@ -3355,9 +3355,9 @@
           <a:p>
             <a:r>
               <a:rPr lang="en-IN"/>
-              <a:t>est12</a:t>
-            </a:r>
-            <a:endParaRPr lang="en-US"/>
+              <a:t>Testest12</a:t>
+            </a:r>
+            <a:endParaRPr lang="en-US" dirty="0"/>
           </a:p>
         </p:txBody>
       </p:sp>

</xml_diff>

<commit_message>
NEW - Commented GitLatch Commit @ 2024-6-25-9-52-3-318
</commit_message>
<xml_diff>
--- a/june25.pptx
+++ b/june25.pptx
@@ -113,6 +113,52 @@
     </p:ext>
   </p:extLst>
 </p:presentation>
+</file>
+
+<file path=ppt/revisionInfo.xml><?xml version="1.0" encoding="utf-8"?>
+<p1510:revInfo xmlns:a="http://schemas.openxmlformats.org/drawingml/2006/main" xmlns:r="http://schemas.openxmlformats.org/officeDocument/2006/relationships" xmlns:p1510="http://schemas.microsoft.com/office/powerpoint/2015/10/main">
+  <p1510:revLst>
+    <p1510:client id="{F5CFAC46-907D-9E47-6EB4-26E74B892FBC}" v="7" dt="2024-06-25T09:51:49.682"/>
+  </p1510:revLst>
+</p1510:revInfo>
+</file>
+
+<file path=ppt/changesInfos/changesInfo1.xml><?xml version="1.0" encoding="utf-8"?>
+<pc:chgInfo xmlns:a="http://schemas.openxmlformats.org/drawingml/2006/main" xmlns:r="http://schemas.openxmlformats.org/officeDocument/2006/relationships" xmlns:ac="http://schemas.microsoft.com/office/drawing/2013/main/command" xmlns:pc="http://schemas.microsoft.com/office/powerpoint/2013/main/command">
+  <pc:docChgLst>
+    <pc:chgData clId="Web-{F5CFAC46-907D-9E47-6EB4-26E74B892FBC}"/>
+    <pc:docChg chg="modSld">
+      <pc:chgData name="" userId="" providerId="" clId="Web-{F5CFAC46-907D-9E47-6EB4-26E74B892FBC}" dt="2024-06-25T09:51:27.197" v="0" actId="20577"/>
+      <pc:docMkLst>
+        <pc:docMk/>
+      </pc:docMkLst>
+      <pc:sldChg chg="modSp">
+        <pc:chgData name="" userId="" providerId="" clId="Web-{F5CFAC46-907D-9E47-6EB4-26E74B892FBC}" dt="2024-06-25T09:51:27.197" v="0" actId="20577"/>
+        <pc:sldMkLst>
+          <pc:docMk/>
+          <pc:sldMk cId="1155956452" sldId="256"/>
+        </pc:sldMkLst>
+        <pc:spChg chg="mod">
+          <ac:chgData name="" userId="" providerId="" clId="Web-{F5CFAC46-907D-9E47-6EB4-26E74B892FBC}" dt="2024-06-25T09:51:27.197" v="0" actId="20577"/>
+          <ac:spMkLst>
+            <pc:docMk/>
+            <pc:sldMk cId="1155956452" sldId="256"/>
+            <ac:spMk id="2" creationId="{2C77BA99-ADAA-7E6B-E5C0-0B85947EBB5F}"/>
+          </ac:spMkLst>
+        </pc:spChg>
+      </pc:sldChg>
+    </pc:docChg>
+  </pc:docChgLst>
+  <pc:docChgLst>
+    <pc:chgData name="TEST_TEST_E3_SharedHb_202405290446_IqyLbnHaHq" userId="S::admin@a830edad9050849rmbs0q4verpe.onmicrosoft.com::5b8786a5-7f36-4411-b4c8-406d78ce0f01" providerId="AD" clId="Web-{F5CFAC46-907D-9E47-6EB4-26E74B892FBC}"/>
+    <pc:docChg chg="replTag">
+      <pc:chgData name="TEST_TEST_E3_SharedHb_202405290446_IqyLbnHaHq" userId="S::admin@a830edad9050849rmbs0q4verpe.onmicrosoft.com::5b8786a5-7f36-4411-b4c8-406d78ce0f01" providerId="AD" clId="Web-{F5CFAC46-907D-9E47-6EB4-26E74B892FBC}" dt="2024-06-25T09:51:49.682" v="5"/>
+      <pc:docMkLst>
+        <pc:docMk/>
+      </pc:docMkLst>
+    </pc:docChg>
+  </pc:docChgLst>
+</pc:chgInfo>
 </file>
 
 <file path=ppt/slideLayouts/slideLayout1.xml><?xml version="1.0" encoding="utf-8"?>
@@ -3355,7 +3401,7 @@
           <a:p>
             <a:r>
               <a:rPr lang="en-IN"/>
-              <a:t>Testest12</a:t>
+              <a:t>NEWTestest12</a:t>
             </a:r>
             <a:endParaRPr lang="en-US" dirty="0"/>
           </a:p>

</xml_diff>

<commit_message>
NEW - Commented GitLatch Commit @ 2024-6-25-9-53-4-609
</commit_message>
<xml_diff>
--- a/june25.pptx
+++ b/june25.pptx
@@ -118,7 +118,7 @@
 <file path=ppt/revisionInfo.xml><?xml version="1.0" encoding="utf-8"?>
 <p1510:revInfo xmlns:a="http://schemas.openxmlformats.org/drawingml/2006/main" xmlns:r="http://schemas.openxmlformats.org/officeDocument/2006/relationships" xmlns:p1510="http://schemas.microsoft.com/office/powerpoint/2015/10/main">
   <p1510:revLst>
-    <p1510:client id="{F5CFAC46-907D-9E47-6EB4-26E74B892FBC}" v="7" dt="2024-06-25T09:51:49.682"/>
+    <p1510:client id="{F5CFAC46-907D-9E47-6EB4-26E74B892FBC}" v="44" dt="2024-06-25T09:53:00.965"/>
   </p1510:revLst>
 </p1510:revInfo>
 </file>
@@ -152,7 +152,7 @@
   <pc:docChgLst>
     <pc:chgData name="TEST_TEST_E3_SharedHb_202405290446_IqyLbnHaHq" userId="S::admin@a830edad9050849rmbs0q4verpe.onmicrosoft.com::5b8786a5-7f36-4411-b4c8-406d78ce0f01" providerId="AD" clId="Web-{F5CFAC46-907D-9E47-6EB4-26E74B892FBC}"/>
     <pc:docChg chg="replTag">
-      <pc:chgData name="TEST_TEST_E3_SharedHb_202405290446_IqyLbnHaHq" userId="S::admin@a830edad9050849rmbs0q4verpe.onmicrosoft.com::5b8786a5-7f36-4411-b4c8-406d78ce0f01" providerId="AD" clId="Web-{F5CFAC46-907D-9E47-6EB4-26E74B892FBC}" dt="2024-06-25T09:51:49.682" v="5"/>
+      <pc:chgData name="TEST_TEST_E3_SharedHb_202405290446_IqyLbnHaHq" userId="S::admin@a830edad9050849rmbs0q4verpe.onmicrosoft.com::5b8786a5-7f36-4411-b4c8-406d78ce0f01" providerId="AD" clId="Web-{F5CFAC46-907D-9E47-6EB4-26E74B892FBC}" dt="2024-06-25T09:53:00.965" v="42"/>
       <pc:docMkLst>
         <pc:docMk/>
       </pc:docMkLst>

</xml_diff>

<commit_message>
te - Commented GitLatch Commit @ 2024-6-25-9-56-1-73
</commit_message>
<xml_diff>
--- a/june25.pptx
+++ b/june25.pptx
@@ -118,7 +118,7 @@
 <file path=ppt/revisionInfo.xml><?xml version="1.0" encoding="utf-8"?>
 <p1510:revInfo xmlns:a="http://schemas.openxmlformats.org/drawingml/2006/main" xmlns:r="http://schemas.openxmlformats.org/officeDocument/2006/relationships" xmlns:p1510="http://schemas.microsoft.com/office/powerpoint/2015/10/main">
   <p1510:revLst>
-    <p1510:client id="{F5CFAC46-907D-9E47-6EB4-26E74B892FBC}" v="44" dt="2024-06-25T09:53:00.965"/>
+    <p1510:client id="{F5CFAC46-907D-9E47-6EB4-26E74B892FBC}" v="69" dt="2024-06-25T09:55:53.673"/>
   </p1510:revLst>
 </p1510:revInfo>
 </file>
@@ -151,11 +151,26 @@
   </pc:docChgLst>
   <pc:docChgLst>
     <pc:chgData name="TEST_TEST_E3_SharedHb_202405290446_IqyLbnHaHq" userId="S::admin@a830edad9050849rmbs0q4verpe.onmicrosoft.com::5b8786a5-7f36-4411-b4c8-406d78ce0f01" providerId="AD" clId="Web-{F5CFAC46-907D-9E47-6EB4-26E74B892FBC}"/>
-    <pc:docChg chg="replTag">
-      <pc:chgData name="TEST_TEST_E3_SharedHb_202405290446_IqyLbnHaHq" userId="S::admin@a830edad9050849rmbs0q4verpe.onmicrosoft.com::5b8786a5-7f36-4411-b4c8-406d78ce0f01" providerId="AD" clId="Web-{F5CFAC46-907D-9E47-6EB4-26E74B892FBC}" dt="2024-06-25T09:53:00.965" v="42"/>
+    <pc:docChg chg="modSld replTag">
+      <pc:chgData name="TEST_TEST_E3_SharedHb_202405290446_IqyLbnHaHq" userId="S::admin@a830edad9050849rmbs0q4verpe.onmicrosoft.com::5b8786a5-7f36-4411-b4c8-406d78ce0f01" providerId="AD" clId="Web-{F5CFAC46-907D-9E47-6EB4-26E74B892FBC}" dt="2024-06-25T09:55:53.673" v="67"/>
       <pc:docMkLst>
         <pc:docMk/>
       </pc:docMkLst>
+      <pc:sldChg chg="modSp">
+        <pc:chgData name="TEST_TEST_E3_SharedHb_202405290446_IqyLbnHaHq" userId="S::admin@a830edad9050849rmbs0q4verpe.onmicrosoft.com::5b8786a5-7f36-4411-b4c8-406d78ce0f01" providerId="AD" clId="Web-{F5CFAC46-907D-9E47-6EB4-26E74B892FBC}" dt="2024-06-25T09:54:01.607" v="55" actId="20577"/>
+        <pc:sldMkLst>
+          <pc:docMk/>
+          <pc:sldMk cId="1155956452" sldId="256"/>
+        </pc:sldMkLst>
+        <pc:spChg chg="mod">
+          <ac:chgData name="TEST_TEST_E3_SharedHb_202405290446_IqyLbnHaHq" userId="S::admin@a830edad9050849rmbs0q4verpe.onmicrosoft.com::5b8786a5-7f36-4411-b4c8-406d78ce0f01" providerId="AD" clId="Web-{F5CFAC46-907D-9E47-6EB4-26E74B892FBC}" dt="2024-06-25T09:54:01.607" v="55" actId="20577"/>
+          <ac:spMkLst>
+            <pc:docMk/>
+            <pc:sldMk cId="1155956452" sldId="256"/>
+            <ac:spMk id="2" creationId="{2C77BA99-ADAA-7E6B-E5C0-0B85947EBB5F}"/>
+          </ac:spMkLst>
+        </pc:spChg>
+      </pc:sldChg>
     </pc:docChg>
   </pc:docChgLst>
 </pc:chgInfo>
@@ -3400,7 +3415,7 @@
           <a:lstStyle/>
           <a:p>
             <a:r>
-              <a:rPr lang="en-IN"/>
+              <a:rPr lang="en-IN" dirty="0"/>
               <a:t>NEWTestest12</a:t>
             </a:r>
             <a:endParaRPr lang="en-US" dirty="0"/>

</xml_diff>

<commit_message>
te - Commented GitLatch Commit @ 2024-6-25-9-57-53-647
</commit_message>
<xml_diff>
--- a/june25.pptx
+++ b/june25.pptx
@@ -118,7 +118,7 @@
 <file path=ppt/revisionInfo.xml><?xml version="1.0" encoding="utf-8"?>
 <p1510:revInfo xmlns:a="http://schemas.openxmlformats.org/drawingml/2006/main" xmlns:r="http://schemas.openxmlformats.org/officeDocument/2006/relationships" xmlns:p1510="http://schemas.microsoft.com/office/powerpoint/2015/10/main">
   <p1510:revLst>
-    <p1510:client id="{F5CFAC46-907D-9E47-6EB4-26E74B892FBC}" v="69" dt="2024-06-25T09:55:53.673"/>
+    <p1510:client id="{F5CFAC46-907D-9E47-6EB4-26E74B892FBC}" v="87" dt="2024-06-25T09:57:32.581"/>
   </p1510:revLst>
 </p1510:revInfo>
 </file>
@@ -152,7 +152,7 @@
   <pc:docChgLst>
     <pc:chgData name="TEST_TEST_E3_SharedHb_202405290446_IqyLbnHaHq" userId="S::admin@a830edad9050849rmbs0q4verpe.onmicrosoft.com::5b8786a5-7f36-4411-b4c8-406d78ce0f01" providerId="AD" clId="Web-{F5CFAC46-907D-9E47-6EB4-26E74B892FBC}"/>
     <pc:docChg chg="modSld replTag">
-      <pc:chgData name="TEST_TEST_E3_SharedHb_202405290446_IqyLbnHaHq" userId="S::admin@a830edad9050849rmbs0q4verpe.onmicrosoft.com::5b8786a5-7f36-4411-b4c8-406d78ce0f01" providerId="AD" clId="Web-{F5CFAC46-907D-9E47-6EB4-26E74B892FBC}" dt="2024-06-25T09:55:53.673" v="67"/>
+      <pc:chgData name="TEST_TEST_E3_SharedHb_202405290446_IqyLbnHaHq" userId="S::admin@a830edad9050849rmbs0q4verpe.onmicrosoft.com::5b8786a5-7f36-4411-b4c8-406d78ce0f01" providerId="AD" clId="Web-{F5CFAC46-907D-9E47-6EB4-26E74B892FBC}" dt="2024-06-25T09:57:32.581" v="85"/>
       <pc:docMkLst>
         <pc:docMk/>
       </pc:docMkLst>

</xml_diff>

<commit_message>
Tt - Commented GitLatch Commit @ 2024-6-25-15-40-53-533
</commit_message>
<xml_diff>
--- a/june25.pptx
+++ b/june25.pptx
@@ -123,59 +123,6 @@
 </p1510:revInfo>
 </file>
 
-<file path=ppt/changesInfos/changesInfo1.xml><?xml version="1.0" encoding="utf-8"?>
-<pc:chgInfo xmlns:a="http://schemas.openxmlformats.org/drawingml/2006/main" xmlns:r="http://schemas.openxmlformats.org/officeDocument/2006/relationships" xmlns:ac="http://schemas.microsoft.com/office/drawing/2013/main/command" xmlns:pc="http://schemas.microsoft.com/office/powerpoint/2013/main/command">
-  <pc:docChgLst>
-    <pc:chgData clId="Web-{F5CFAC46-907D-9E47-6EB4-26E74B892FBC}"/>
-    <pc:docChg chg="modSld">
-      <pc:chgData name="" userId="" providerId="" clId="Web-{F5CFAC46-907D-9E47-6EB4-26E74B892FBC}" dt="2024-06-25T09:51:27.197" v="0" actId="20577"/>
-      <pc:docMkLst>
-        <pc:docMk/>
-      </pc:docMkLst>
-      <pc:sldChg chg="modSp">
-        <pc:chgData name="" userId="" providerId="" clId="Web-{F5CFAC46-907D-9E47-6EB4-26E74B892FBC}" dt="2024-06-25T09:51:27.197" v="0" actId="20577"/>
-        <pc:sldMkLst>
-          <pc:docMk/>
-          <pc:sldMk cId="1155956452" sldId="256"/>
-        </pc:sldMkLst>
-        <pc:spChg chg="mod">
-          <ac:chgData name="" userId="" providerId="" clId="Web-{F5CFAC46-907D-9E47-6EB4-26E74B892FBC}" dt="2024-06-25T09:51:27.197" v="0" actId="20577"/>
-          <ac:spMkLst>
-            <pc:docMk/>
-            <pc:sldMk cId="1155956452" sldId="256"/>
-            <ac:spMk id="2" creationId="{2C77BA99-ADAA-7E6B-E5C0-0B85947EBB5F}"/>
-          </ac:spMkLst>
-        </pc:spChg>
-      </pc:sldChg>
-    </pc:docChg>
-  </pc:docChgLst>
-  <pc:docChgLst>
-    <pc:chgData name="TEST_TEST_E3_SharedHb_202405290446_IqyLbnHaHq" userId="S::admin@a830edad9050849rmbs0q4verpe.onmicrosoft.com::5b8786a5-7f36-4411-b4c8-406d78ce0f01" providerId="AD" clId="Web-{F5CFAC46-907D-9E47-6EB4-26E74B892FBC}"/>
-    <pc:docChg chg="modSld replTag">
-      <pc:chgData name="TEST_TEST_E3_SharedHb_202405290446_IqyLbnHaHq" userId="S::admin@a830edad9050849rmbs0q4verpe.onmicrosoft.com::5b8786a5-7f36-4411-b4c8-406d78ce0f01" providerId="AD" clId="Web-{F5CFAC46-907D-9E47-6EB4-26E74B892FBC}" dt="2024-06-25T09:57:32.581" v="85"/>
-      <pc:docMkLst>
-        <pc:docMk/>
-      </pc:docMkLst>
-      <pc:sldChg chg="modSp">
-        <pc:chgData name="TEST_TEST_E3_SharedHb_202405290446_IqyLbnHaHq" userId="S::admin@a830edad9050849rmbs0q4verpe.onmicrosoft.com::5b8786a5-7f36-4411-b4c8-406d78ce0f01" providerId="AD" clId="Web-{F5CFAC46-907D-9E47-6EB4-26E74B892FBC}" dt="2024-06-25T09:54:01.607" v="55" actId="20577"/>
-        <pc:sldMkLst>
-          <pc:docMk/>
-          <pc:sldMk cId="1155956452" sldId="256"/>
-        </pc:sldMkLst>
-        <pc:spChg chg="mod">
-          <ac:chgData name="TEST_TEST_E3_SharedHb_202405290446_IqyLbnHaHq" userId="S::admin@a830edad9050849rmbs0q4verpe.onmicrosoft.com::5b8786a5-7f36-4411-b4c8-406d78ce0f01" providerId="AD" clId="Web-{F5CFAC46-907D-9E47-6EB4-26E74B892FBC}" dt="2024-06-25T09:54:01.607" v="55" actId="20577"/>
-          <ac:spMkLst>
-            <pc:docMk/>
-            <pc:sldMk cId="1155956452" sldId="256"/>
-            <ac:spMk id="2" creationId="{2C77BA99-ADAA-7E6B-E5C0-0B85947EBB5F}"/>
-          </ac:spMkLst>
-        </pc:spChg>
-      </pc:sldChg>
-    </pc:docChg>
-  </pc:docChgLst>
-</pc:chgInfo>
-</file>
-
 <file path=ppt/slideLayouts/slideLayout1.xml><?xml version="1.0" encoding="utf-8"?>
 <p:sldLayout xmlns:a="http://schemas.openxmlformats.org/drawingml/2006/main" xmlns:r="http://schemas.openxmlformats.org/officeDocument/2006/relationships" xmlns:p="http://schemas.openxmlformats.org/presentationml/2006/main" type="title" preserve="1">
   <p:cSld name="Title Slide">
@@ -323,7 +270,7 @@
           <a:p>
             <a:fld id="{F465A414-5ADB-4178-BBB9-F6D5CBEA4350}" type="datetimeFigureOut">
               <a:rPr lang="en-US" smtClean="0"/>
-              <a:t>6/25/2024</a:t>
+              <a:t>6/25/24</a:t>
             </a:fld>
             <a:endParaRPr lang="en-US"/>
           </a:p>
@@ -521,7 +468,7 @@
           <a:p>
             <a:fld id="{F465A414-5ADB-4178-BBB9-F6D5CBEA4350}" type="datetimeFigureOut">
               <a:rPr lang="en-US" smtClean="0"/>
-              <a:t>6/25/2024</a:t>
+              <a:t>6/25/24</a:t>
             </a:fld>
             <a:endParaRPr lang="en-US"/>
           </a:p>
@@ -729,7 +676,7 @@
           <a:p>
             <a:fld id="{F465A414-5ADB-4178-BBB9-F6D5CBEA4350}" type="datetimeFigureOut">
               <a:rPr lang="en-US" smtClean="0"/>
-              <a:t>6/25/2024</a:t>
+              <a:t>6/25/24</a:t>
             </a:fld>
             <a:endParaRPr lang="en-US"/>
           </a:p>
@@ -927,7 +874,7 @@
           <a:p>
             <a:fld id="{F465A414-5ADB-4178-BBB9-F6D5CBEA4350}" type="datetimeFigureOut">
               <a:rPr lang="en-US" smtClean="0"/>
-              <a:t>6/25/2024</a:t>
+              <a:t>6/25/24</a:t>
             </a:fld>
             <a:endParaRPr lang="en-US"/>
           </a:p>
@@ -1202,7 +1149,7 @@
           <a:p>
             <a:fld id="{F465A414-5ADB-4178-BBB9-F6D5CBEA4350}" type="datetimeFigureOut">
               <a:rPr lang="en-US" smtClean="0"/>
-              <a:t>6/25/2024</a:t>
+              <a:t>6/25/24</a:t>
             </a:fld>
             <a:endParaRPr lang="en-US"/>
           </a:p>
@@ -1467,7 +1414,7 @@
           <a:p>
             <a:fld id="{F465A414-5ADB-4178-BBB9-F6D5CBEA4350}" type="datetimeFigureOut">
               <a:rPr lang="en-US" smtClean="0"/>
-              <a:t>6/25/2024</a:t>
+              <a:t>6/25/24</a:t>
             </a:fld>
             <a:endParaRPr lang="en-US"/>
           </a:p>
@@ -1879,7 +1826,7 @@
           <a:p>
             <a:fld id="{F465A414-5ADB-4178-BBB9-F6D5CBEA4350}" type="datetimeFigureOut">
               <a:rPr lang="en-US" smtClean="0"/>
-              <a:t>6/25/2024</a:t>
+              <a:t>6/25/24</a:t>
             </a:fld>
             <a:endParaRPr lang="en-US"/>
           </a:p>
@@ -2020,7 +1967,7 @@
           <a:p>
             <a:fld id="{F465A414-5ADB-4178-BBB9-F6D5CBEA4350}" type="datetimeFigureOut">
               <a:rPr lang="en-US" smtClean="0"/>
-              <a:t>6/25/2024</a:t>
+              <a:t>6/25/24</a:t>
             </a:fld>
             <a:endParaRPr lang="en-US"/>
           </a:p>
@@ -2133,7 +2080,7 @@
           <a:p>
             <a:fld id="{F465A414-5ADB-4178-BBB9-F6D5CBEA4350}" type="datetimeFigureOut">
               <a:rPr lang="en-US" smtClean="0"/>
-              <a:t>6/25/2024</a:t>
+              <a:t>6/25/24</a:t>
             </a:fld>
             <a:endParaRPr lang="en-US"/>
           </a:p>
@@ -2444,7 +2391,7 @@
           <a:p>
             <a:fld id="{F465A414-5ADB-4178-BBB9-F6D5CBEA4350}" type="datetimeFigureOut">
               <a:rPr lang="en-US" smtClean="0"/>
-              <a:t>6/25/2024</a:t>
+              <a:t>6/25/24</a:t>
             </a:fld>
             <a:endParaRPr lang="en-US"/>
           </a:p>
@@ -2735,7 +2682,7 @@
           <a:p>
             <a:fld id="{F465A414-5ADB-4178-BBB9-F6D5CBEA4350}" type="datetimeFigureOut">
               <a:rPr lang="en-US" smtClean="0"/>
-              <a:t>6/25/2024</a:t>
+              <a:t>6/25/24</a:t>
             </a:fld>
             <a:endParaRPr lang="en-US"/>
           </a:p>
@@ -2976,7 +2923,7 @@
           <a:p>
             <a:fld id="{F465A414-5ADB-4178-BBB9-F6D5CBEA4350}" type="datetimeFigureOut">
               <a:rPr lang="en-US" smtClean="0"/>
-              <a:t>6/25/2024</a:t>
+              <a:t>6/25/24</a:t>
             </a:fld>
             <a:endParaRPr lang="en-US"/>
           </a:p>
@@ -3415,8 +3362,8 @@
           <a:lstStyle/>
           <a:p>
             <a:r>
-              <a:rPr lang="en-IN" dirty="0"/>
-              <a:t>NEWTestest12</a:t>
+              <a:rPr lang="en-IN"/>
+              <a:t>NEWTestest12122</a:t>
             </a:r>
             <a:endParaRPr lang="en-US" dirty="0"/>
           </a:p>

</xml_diff>

<commit_message>
Updated - Commented GitLatch Commit @ 2024-6-26-5-17-21-423
</commit_message>
<xml_diff>
--- a/june25.pptx
+++ b/june25.pptx
@@ -270,7 +270,7 @@
           <a:p>
             <a:fld id="{F465A414-5ADB-4178-BBB9-F6D5CBEA4350}" type="datetimeFigureOut">
               <a:rPr lang="en-US" smtClean="0"/>
-              <a:t>6/25/24</a:t>
+              <a:t>6/26/2024</a:t>
             </a:fld>
             <a:endParaRPr lang="en-US"/>
           </a:p>
@@ -468,7 +468,7 @@
           <a:p>
             <a:fld id="{F465A414-5ADB-4178-BBB9-F6D5CBEA4350}" type="datetimeFigureOut">
               <a:rPr lang="en-US" smtClean="0"/>
-              <a:t>6/25/24</a:t>
+              <a:t>6/26/2024</a:t>
             </a:fld>
             <a:endParaRPr lang="en-US"/>
           </a:p>
@@ -676,7 +676,7 @@
           <a:p>
             <a:fld id="{F465A414-5ADB-4178-BBB9-F6D5CBEA4350}" type="datetimeFigureOut">
               <a:rPr lang="en-US" smtClean="0"/>
-              <a:t>6/25/24</a:t>
+              <a:t>6/26/2024</a:t>
             </a:fld>
             <a:endParaRPr lang="en-US"/>
           </a:p>
@@ -874,7 +874,7 @@
           <a:p>
             <a:fld id="{F465A414-5ADB-4178-BBB9-F6D5CBEA4350}" type="datetimeFigureOut">
               <a:rPr lang="en-US" smtClean="0"/>
-              <a:t>6/25/24</a:t>
+              <a:t>6/26/2024</a:t>
             </a:fld>
             <a:endParaRPr lang="en-US"/>
           </a:p>
@@ -1149,7 +1149,7 @@
           <a:p>
             <a:fld id="{F465A414-5ADB-4178-BBB9-F6D5CBEA4350}" type="datetimeFigureOut">
               <a:rPr lang="en-US" smtClean="0"/>
-              <a:t>6/25/24</a:t>
+              <a:t>6/26/2024</a:t>
             </a:fld>
             <a:endParaRPr lang="en-US"/>
           </a:p>
@@ -1414,7 +1414,7 @@
           <a:p>
             <a:fld id="{F465A414-5ADB-4178-BBB9-F6D5CBEA4350}" type="datetimeFigureOut">
               <a:rPr lang="en-US" smtClean="0"/>
-              <a:t>6/25/24</a:t>
+              <a:t>6/26/2024</a:t>
             </a:fld>
             <a:endParaRPr lang="en-US"/>
           </a:p>
@@ -1826,7 +1826,7 @@
           <a:p>
             <a:fld id="{F465A414-5ADB-4178-BBB9-F6D5CBEA4350}" type="datetimeFigureOut">
               <a:rPr lang="en-US" smtClean="0"/>
-              <a:t>6/25/24</a:t>
+              <a:t>6/26/2024</a:t>
             </a:fld>
             <a:endParaRPr lang="en-US"/>
           </a:p>
@@ -1967,7 +1967,7 @@
           <a:p>
             <a:fld id="{F465A414-5ADB-4178-BBB9-F6D5CBEA4350}" type="datetimeFigureOut">
               <a:rPr lang="en-US" smtClean="0"/>
-              <a:t>6/25/24</a:t>
+              <a:t>6/26/2024</a:t>
             </a:fld>
             <a:endParaRPr lang="en-US"/>
           </a:p>
@@ -2080,7 +2080,7 @@
           <a:p>
             <a:fld id="{F465A414-5ADB-4178-BBB9-F6D5CBEA4350}" type="datetimeFigureOut">
               <a:rPr lang="en-US" smtClean="0"/>
-              <a:t>6/25/24</a:t>
+              <a:t>6/26/2024</a:t>
             </a:fld>
             <a:endParaRPr lang="en-US"/>
           </a:p>
@@ -2391,7 +2391,7 @@
           <a:p>
             <a:fld id="{F465A414-5ADB-4178-BBB9-F6D5CBEA4350}" type="datetimeFigureOut">
               <a:rPr lang="en-US" smtClean="0"/>
-              <a:t>6/25/24</a:t>
+              <a:t>6/26/2024</a:t>
             </a:fld>
             <a:endParaRPr lang="en-US"/>
           </a:p>
@@ -2682,7 +2682,7 @@
           <a:p>
             <a:fld id="{F465A414-5ADB-4178-BBB9-F6D5CBEA4350}" type="datetimeFigureOut">
               <a:rPr lang="en-US" smtClean="0"/>
-              <a:t>6/25/24</a:t>
+              <a:t>6/26/2024</a:t>
             </a:fld>
             <a:endParaRPr lang="en-US"/>
           </a:p>
@@ -2923,7 +2923,7 @@
           <a:p>
             <a:fld id="{F465A414-5ADB-4178-BBB9-F6D5CBEA4350}" type="datetimeFigureOut">
               <a:rPr lang="en-US" smtClean="0"/>
-              <a:t>6/25/24</a:t>
+              <a:t>6/26/2024</a:t>
             </a:fld>
             <a:endParaRPr lang="en-US"/>
           </a:p>
@@ -3390,7 +3390,22 @@
           <a:bodyPr/>
           <a:lstStyle/>
           <a:p>
-            <a:endParaRPr lang="en-US"/>
+            <a:r>
+              <a:rPr lang="en-US" dirty="0"/>
+              <a:t>Test</a:t>
+            </a:r>
+          </a:p>
+          <a:p>
+            <a:r>
+              <a:rPr lang="en-US" dirty="0"/>
+              <a:t>Sample</a:t>
+            </a:r>
+          </a:p>
+          <a:p>
+            <a:r>
+              <a:rPr lang="en-US" dirty="0"/>
+              <a:t>Demo</a:t>
+            </a:r>
           </a:p>
         </p:txBody>
       </p:sp>
@@ -3734,7 +3749,7 @@
 
 <file path=ppt/webextensions/taskpanes.xml><?xml version="1.0" encoding="utf-8"?>
 <wetp:taskpanes xmlns:wetp="http://schemas.microsoft.com/office/webextensions/taskpanes/2010/11">
-  <wetp:taskpane dockstate="right" visibility="0" width="525" row="0">
+  <wetp:taskpane dockstate="right" visibility="0" width="438" row="2">
     <wetp:webextensionref xmlns:r="http://schemas.openxmlformats.org/officeDocument/2006/relationships" r:id="rId1"/>
   </wetp:taskpane>
 </wetp:taskpanes>

</xml_diff>